<commit_message>
executable model working fine
</commit_message>
<xml_diff>
--- a/FinalTask/userDocs/img/final_task_schema.pptx
+++ b/FinalTask/userDocs/img/final_task_schema.pptx
@@ -247,7 +247,7 @@
           <a:p>
             <a:fld id="{B54D5996-1787-4713-9AAF-D983FFC67929}" type="datetimeFigureOut">
               <a:rPr lang="it-IT" smtClean="0"/>
-              <a:t>22/06/2021</a:t>
+              <a:t>24/06/2021</a:t>
             </a:fld>
             <a:endParaRPr lang="it-IT"/>
           </a:p>
@@ -415,7 +415,7 @@
           <a:p>
             <a:fld id="{B54D5996-1787-4713-9AAF-D983FFC67929}" type="datetimeFigureOut">
               <a:rPr lang="it-IT" smtClean="0"/>
-              <a:t>22/06/2021</a:t>
+              <a:t>24/06/2021</a:t>
             </a:fld>
             <a:endParaRPr lang="it-IT"/>
           </a:p>
@@ -593,7 +593,7 @@
           <a:p>
             <a:fld id="{B54D5996-1787-4713-9AAF-D983FFC67929}" type="datetimeFigureOut">
               <a:rPr lang="it-IT" smtClean="0"/>
-              <a:t>22/06/2021</a:t>
+              <a:t>24/06/2021</a:t>
             </a:fld>
             <a:endParaRPr lang="it-IT"/>
           </a:p>
@@ -761,7 +761,7 @@
           <a:p>
             <a:fld id="{B54D5996-1787-4713-9AAF-D983FFC67929}" type="datetimeFigureOut">
               <a:rPr lang="it-IT" smtClean="0"/>
-              <a:t>22/06/2021</a:t>
+              <a:t>24/06/2021</a:t>
             </a:fld>
             <a:endParaRPr lang="it-IT"/>
           </a:p>
@@ -1006,7 +1006,7 @@
           <a:p>
             <a:fld id="{B54D5996-1787-4713-9AAF-D983FFC67929}" type="datetimeFigureOut">
               <a:rPr lang="it-IT" smtClean="0"/>
-              <a:t>22/06/2021</a:t>
+              <a:t>24/06/2021</a:t>
             </a:fld>
             <a:endParaRPr lang="it-IT"/>
           </a:p>
@@ -1235,7 +1235,7 @@
           <a:p>
             <a:fld id="{B54D5996-1787-4713-9AAF-D983FFC67929}" type="datetimeFigureOut">
               <a:rPr lang="it-IT" smtClean="0"/>
-              <a:t>22/06/2021</a:t>
+              <a:t>24/06/2021</a:t>
             </a:fld>
             <a:endParaRPr lang="it-IT"/>
           </a:p>
@@ -1599,7 +1599,7 @@
           <a:p>
             <a:fld id="{B54D5996-1787-4713-9AAF-D983FFC67929}" type="datetimeFigureOut">
               <a:rPr lang="it-IT" smtClean="0"/>
-              <a:t>22/06/2021</a:t>
+              <a:t>24/06/2021</a:t>
             </a:fld>
             <a:endParaRPr lang="it-IT"/>
           </a:p>
@@ -1716,7 +1716,7 @@
           <a:p>
             <a:fld id="{B54D5996-1787-4713-9AAF-D983FFC67929}" type="datetimeFigureOut">
               <a:rPr lang="it-IT" smtClean="0"/>
-              <a:t>22/06/2021</a:t>
+              <a:t>24/06/2021</a:t>
             </a:fld>
             <a:endParaRPr lang="it-IT"/>
           </a:p>
@@ -1811,7 +1811,7 @@
           <a:p>
             <a:fld id="{B54D5996-1787-4713-9AAF-D983FFC67929}" type="datetimeFigureOut">
               <a:rPr lang="it-IT" smtClean="0"/>
-              <a:t>22/06/2021</a:t>
+              <a:t>24/06/2021</a:t>
             </a:fld>
             <a:endParaRPr lang="it-IT"/>
           </a:p>
@@ -2086,7 +2086,7 @@
           <a:p>
             <a:fld id="{B54D5996-1787-4713-9AAF-D983FFC67929}" type="datetimeFigureOut">
               <a:rPr lang="it-IT" smtClean="0"/>
-              <a:t>22/06/2021</a:t>
+              <a:t>24/06/2021</a:t>
             </a:fld>
             <a:endParaRPr lang="it-IT"/>
           </a:p>
@@ -2338,7 +2338,7 @@
           <a:p>
             <a:fld id="{B54D5996-1787-4713-9AAF-D983FFC67929}" type="datetimeFigureOut">
               <a:rPr lang="it-IT" smtClean="0"/>
-              <a:t>22/06/2021</a:t>
+              <a:t>24/06/2021</a:t>
             </a:fld>
             <a:endParaRPr lang="it-IT"/>
           </a:p>
@@ -2549,7 +2549,7 @@
           <a:p>
             <a:fld id="{B54D5996-1787-4713-9AAF-D983FFC67929}" type="datetimeFigureOut">
               <a:rPr lang="it-IT" smtClean="0"/>
-              <a:t>22/06/2021</a:t>
+              <a:t>24/06/2021</a:t>
             </a:fld>
             <a:endParaRPr lang="it-IT"/>
           </a:p>
@@ -8289,8 +8289,8 @@
         </p:nvSpPr>
         <p:spPr>
           <a:xfrm>
-            <a:off x="1552667" y="2216461"/>
-            <a:ext cx="1749197" cy="523220"/>
+            <a:off x="1585355" y="2321600"/>
+            <a:ext cx="1749197" cy="307777"/>
           </a:xfrm>
           <a:prstGeom prst="rect">
             <a:avLst/>
@@ -8303,6 +8303,17 @@
           </a:bodyPr>
           <a:lstStyle/>
           <a:p>
+            <a:r>
+              <a:rPr lang="it-IT" sz="1400" dirty="0" smtClean="0">
+                <a:solidFill>
+                  <a:schemeClr val="accent1">
+                    <a:lumMod val="75000"/>
+                  </a:schemeClr>
+                </a:solidFill>
+                <a:latin typeface="Century Schoolbook" panose="02040604050505020304" pitchFamily="18" charset="0"/>
+              </a:rPr>
+              <a:t>INDOOR-area </a:t>
+            </a:r>
             <a:r>
               <a:rPr lang="it-IT" sz="1400" dirty="0">
                 <a:solidFill>
@@ -8312,20 +8323,7 @@
                 </a:solidFill>
                 <a:latin typeface="Century Schoolbook" panose="02040604050505020304" pitchFamily="18" charset="0"/>
               </a:rPr>
-              <a:t>slot available</a:t>
-            </a:r>
-          </a:p>
-          <a:p>
-            <a:r>
-              <a:rPr lang="it-IT" sz="1400" dirty="0">
-                <a:solidFill>
-                  <a:schemeClr val="accent1">
-                    <a:lumMod val="75000"/>
-                  </a:schemeClr>
-                </a:solidFill>
-                <a:latin typeface="Century Schoolbook" panose="02040604050505020304" pitchFamily="18" charset="0"/>
-              </a:rPr>
-              <a:t>INDOOR-area free</a:t>
+              <a:t>free</a:t>
             </a:r>
           </a:p>
         </p:txBody>
@@ -8375,50 +8373,6 @@
         <p:spPr>
           <a:xfrm>
             <a:off x="2231240" y="3930805"/>
-            <a:ext cx="1072730" cy="307777"/>
-          </a:xfrm>
-          <a:prstGeom prst="rect">
-            <a:avLst/>
-          </a:prstGeom>
-          <a:noFill/>
-        </p:spPr>
-        <p:txBody>
-          <a:bodyPr wrap="none" rtlCol="0">
-            <a:spAutoFit/>
-          </a:bodyPr>
-          <a:lstStyle/>
-          <a:p>
-            <a:r>
-              <a:rPr lang="it-IT" sz="1400" dirty="0">
-                <a:solidFill>
-                  <a:schemeClr val="accent1">
-                    <a:lumMod val="75000"/>
-                  </a:schemeClr>
-                </a:solidFill>
-                <a:latin typeface="Century Schoolbook" panose="02040604050505020304" pitchFamily="18" charset="0"/>
-              </a:rPr>
-              <a:t>when done</a:t>
-            </a:r>
-            <a:endParaRPr lang="it-IT" sz="1400" dirty="0">
-              <a:solidFill>
-                <a:schemeClr val="accent2">
-                  <a:lumMod val="75000"/>
-                </a:schemeClr>
-              </a:solidFill>
-              <a:latin typeface="Century Schoolbook" panose="02040604050505020304" pitchFamily="18" charset="0"/>
-            </a:endParaRPr>
-          </a:p>
-        </p:txBody>
-      </p:sp>
-      <p:sp>
-        <p:nvSpPr>
-          <p:cNvPr id="86" name="CasellaDiTesto 85"/>
-          <p:cNvSpPr txBox="1"/>
-          <p:nvPr/>
-        </p:nvSpPr>
-        <p:spPr>
-          <a:xfrm>
-            <a:off x="2231240" y="4665359"/>
             <a:ext cx="1072730" cy="307777"/>
           </a:xfrm>
           <a:prstGeom prst="rect">
@@ -8915,6 +8869,50 @@
               </a:rPr>
               <a:t>else</a:t>
             </a:r>
+          </a:p>
+        </p:txBody>
+      </p:sp>
+      <p:sp>
+        <p:nvSpPr>
+          <p:cNvPr id="41" name="CasellaDiTesto 40"/>
+          <p:cNvSpPr txBox="1"/>
+          <p:nvPr/>
+        </p:nvSpPr>
+        <p:spPr>
+          <a:xfrm>
+            <a:off x="3051614" y="4672766"/>
+            <a:ext cx="268022" cy="307777"/>
+          </a:xfrm>
+          <a:prstGeom prst="rect">
+            <a:avLst/>
+          </a:prstGeom>
+          <a:noFill/>
+        </p:spPr>
+        <p:txBody>
+          <a:bodyPr wrap="none" rtlCol="0">
+            <a:spAutoFit/>
+          </a:bodyPr>
+          <a:lstStyle/>
+          <a:p>
+            <a:r>
+              <a:rPr lang="el-GR" sz="1400" dirty="0">
+                <a:solidFill>
+                  <a:schemeClr val="accent1">
+                    <a:lumMod val="75000"/>
+                  </a:schemeClr>
+                </a:solidFill>
+                <a:latin typeface="Century Schoolbook" panose="02040604050505020304" pitchFamily="18" charset="0"/>
+              </a:rPr>
+              <a:t>ε</a:t>
+            </a:r>
+            <a:endParaRPr lang="it-IT" sz="1400" dirty="0">
+              <a:solidFill>
+                <a:schemeClr val="accent1">
+                  <a:lumMod val="75000"/>
+                </a:schemeClr>
+              </a:solidFill>
+              <a:latin typeface="Century Schoolbook" panose="02040604050505020304" pitchFamily="18" charset="0"/>
+            </a:endParaRPr>
           </a:p>
         </p:txBody>
       </p:sp>

</xml_diff>

<commit_message>
some corrections after the review
</commit_message>
<xml_diff>
--- a/FinalTask/userDocs/img/final_task_schema.pptx
+++ b/FinalTask/userDocs/img/final_task_schema.pptx
@@ -5666,26 +5666,38 @@
           <a:p>
             <a:pPr algn="ctr"/>
             <a:r>
+              <a:rPr lang="it-IT" sz="1400" dirty="0" smtClean="0">
+                <a:solidFill>
+                  <a:schemeClr val="tx1"/>
+                </a:solidFill>
+                <a:latin typeface="Century Schoolbook" panose="02040604050505020304" pitchFamily="18" charset="0"/>
+              </a:rPr>
+              <a:t>Trolley</a:t>
+            </a:r>
+            <a:r>
               <a:rPr lang="it-IT" sz="1400" dirty="0">
                 <a:solidFill>
                   <a:schemeClr val="tx1"/>
                 </a:solidFill>
                 <a:latin typeface="Century Schoolbook" panose="02040604050505020304" pitchFamily="18" charset="0"/>
               </a:rPr>
-              <a:t>Business</a:t>
-            </a:r>
-          </a:p>
-          <a:p>
-            <a:pPr algn="ctr"/>
-            <a:r>
-              <a:rPr lang="it-IT" sz="1400" dirty="0">
+              <a:t> </a:t>
+            </a:r>
+            <a:r>
+              <a:rPr lang="it-IT" sz="1400" dirty="0" smtClean="0">
                 <a:solidFill>
                   <a:schemeClr val="tx1"/>
                 </a:solidFill>
                 <a:latin typeface="Century Schoolbook" panose="02040604050505020304" pitchFamily="18" charset="0"/>
               </a:rPr>
-              <a:t>Logic</a:t>
-            </a:r>
+              <a:t>Actor</a:t>
+            </a:r>
+            <a:endParaRPr lang="it-IT" sz="1400" dirty="0" smtClean="0">
+              <a:solidFill>
+                <a:schemeClr val="tx1"/>
+              </a:solidFill>
+              <a:latin typeface="Century Schoolbook" panose="02040604050505020304" pitchFamily="18" charset="0"/>
+            </a:endParaRPr>
           </a:p>
         </p:txBody>
       </p:sp>
@@ -9601,9 +9613,21 @@
                 </a:rPr>
                 <a:t>Park Service Status GUI Actor</a:t>
               </a:r>
+            </a:p>
+            <a:p>
+              <a:pPr lvl="0" algn="ctr"/>
+              <a:r>
+                <a:rPr lang="it-IT" sz="1100" i="1" dirty="0" smtClean="0">
+                  <a:solidFill>
+                    <a:prstClr val="black"/>
+                  </a:solidFill>
+                  <a:latin typeface="Century Schoolbook" panose="02040604050505020304" pitchFamily="18" charset="0"/>
+                </a:rPr>
+                <a:t>(manager’s)</a:t>
+              </a:r>
               <a:endParaRPr lang="it-IT" sz="1400" i="1" dirty="0">
                 <a:solidFill>
-                  <a:schemeClr val="tx1"/>
+                  <a:prstClr val="black"/>
                 </a:solidFill>
                 <a:latin typeface="Century Schoolbook" panose="02040604050505020304" pitchFamily="18" charset="0"/>
               </a:endParaRPr>
@@ -9780,9 +9804,21 @@
                 </a:rPr>
                 <a:t>Park Service GUI Actor</a:t>
               </a:r>
+            </a:p>
+            <a:p>
+              <a:pPr lvl="0" algn="ctr"/>
+              <a:r>
+                <a:rPr lang="it-IT" sz="1100" i="1" dirty="0" smtClean="0">
+                  <a:solidFill>
+                    <a:prstClr val="black"/>
+                  </a:solidFill>
+                  <a:latin typeface="Century Schoolbook" panose="02040604050505020304" pitchFamily="18" charset="0"/>
+                </a:rPr>
+                <a:t>(client’s)</a:t>
+              </a:r>
               <a:endParaRPr lang="it-IT" sz="1400" i="1" dirty="0">
                 <a:solidFill>
-                  <a:schemeClr val="tx1"/>
+                  <a:prstClr val="black"/>
                 </a:solidFill>
                 <a:latin typeface="Century Schoolbook" panose="02040604050505020304" pitchFamily="18" charset="0"/>
               </a:endParaRPr>
@@ -10348,128 +10384,6 @@
           </a:fontRef>
         </p:style>
       </p:cxnSp>
-      <p:grpSp>
-        <p:nvGrpSpPr>
-          <p:cNvPr id="73" name="Gruppo 72"/>
-          <p:cNvGrpSpPr/>
-          <p:nvPr/>
-        </p:nvGrpSpPr>
-        <p:grpSpPr>
-          <a:xfrm>
-            <a:off x="8496420" y="2517758"/>
-            <a:ext cx="1660945" cy="1214172"/>
-            <a:chOff x="9616460" y="2966720"/>
-            <a:chExt cx="1660945" cy="1214172"/>
-          </a:xfrm>
-        </p:grpSpPr>
-        <p:sp>
-          <p:nvSpPr>
-            <p:cNvPr id="69" name="Ovale 68"/>
-            <p:cNvSpPr/>
-            <p:nvPr/>
-          </p:nvSpPr>
-          <p:spPr>
-            <a:xfrm>
-              <a:off x="9616460" y="3114959"/>
-              <a:ext cx="1660945" cy="1065933"/>
-            </a:xfrm>
-            <a:prstGeom prst="ellipse">
-              <a:avLst/>
-            </a:prstGeom>
-            <a:solidFill>
-              <a:schemeClr val="accent4">
-                <a:lumMod val="20000"/>
-                <a:lumOff val="80000"/>
-              </a:schemeClr>
-            </a:solidFill>
-            <a:ln w="12700">
-              <a:solidFill>
-                <a:schemeClr val="tx1"/>
-              </a:solidFill>
-            </a:ln>
-          </p:spPr>
-          <p:style>
-            <a:lnRef idx="2">
-              <a:schemeClr val="accent1">
-                <a:shade val="50000"/>
-              </a:schemeClr>
-            </a:lnRef>
-            <a:fillRef idx="1">
-              <a:schemeClr val="accent1"/>
-            </a:fillRef>
-            <a:effectRef idx="0">
-              <a:schemeClr val="accent1"/>
-            </a:effectRef>
-            <a:fontRef idx="minor">
-              <a:schemeClr val="lt1"/>
-            </a:fontRef>
-          </p:style>
-          <p:txBody>
-            <a:bodyPr rtlCol="0" anchor="ctr"/>
-            <a:lstStyle/>
-            <a:p>
-              <a:pPr algn="ctr"/>
-              <a:r>
-                <a:rPr lang="it-IT" sz="1200" dirty="0" smtClean="0">
-                  <a:solidFill>
-                    <a:schemeClr val="tx1"/>
-                  </a:solidFill>
-                  <a:latin typeface="Century Schoolbook" panose="02040604050505020304" pitchFamily="18" charset="0"/>
-                </a:rPr>
-                <a:t>Virtual Environment</a:t>
-              </a:r>
-            </a:p>
-          </p:txBody>
-        </p:sp>
-        <p:sp>
-          <p:nvSpPr>
-            <p:cNvPr id="70" name="Triangolo isoscele 69"/>
-            <p:cNvSpPr/>
-            <p:nvPr/>
-          </p:nvSpPr>
-          <p:spPr>
-            <a:xfrm rot="16200000">
-              <a:off x="10298693" y="2987166"/>
-              <a:ext cx="296478" cy="255585"/>
-            </a:xfrm>
-            <a:prstGeom prst="triangle">
-              <a:avLst/>
-            </a:prstGeom>
-            <a:solidFill>
-              <a:srgbClr val="FF0000"/>
-            </a:solidFill>
-            <a:ln w="12700">
-              <a:solidFill>
-                <a:schemeClr val="tx1"/>
-              </a:solidFill>
-            </a:ln>
-          </p:spPr>
-          <p:style>
-            <a:lnRef idx="2">
-              <a:schemeClr val="accent1">
-                <a:shade val="50000"/>
-              </a:schemeClr>
-            </a:lnRef>
-            <a:fillRef idx="1">
-              <a:schemeClr val="accent1"/>
-            </a:fillRef>
-            <a:effectRef idx="0">
-              <a:schemeClr val="accent1"/>
-            </a:effectRef>
-            <a:fontRef idx="minor">
-              <a:schemeClr val="lt1"/>
-            </a:fontRef>
-          </p:style>
-          <p:txBody>
-            <a:bodyPr rtlCol="0" anchor="ctr"/>
-            <a:lstStyle/>
-            <a:p>
-              <a:pPr algn="ctr"/>
-              <a:endParaRPr lang="it-IT"/>
-            </a:p>
-          </p:txBody>
-        </p:sp>
-      </p:grpSp>
       <p:sp>
         <p:nvSpPr>
           <p:cNvPr id="74" name="Figura a mano libera 73"/>
@@ -11071,8 +10985,8 @@
         </p:nvSpPr>
         <p:spPr>
           <a:xfrm>
-            <a:off x="7281805" y="2591877"/>
-            <a:ext cx="1313180" cy="276999"/>
+            <a:off x="7358613" y="2618259"/>
+            <a:ext cx="1428596" cy="276999"/>
           </a:xfrm>
           <a:prstGeom prst="rect">
             <a:avLst/>
@@ -11094,7 +11008,7 @@
                 </a:solidFill>
                 <a:latin typeface="Bookman Old Style" panose="02050604050505020204" pitchFamily="18" charset="0"/>
               </a:rPr>
-              <a:t>move to: &lt;X,Y&gt;</a:t>
+              <a:t>goto: &lt;location&gt;</a:t>
             </a:r>
             <a:endParaRPr lang="it-IT" sz="1200" dirty="0">
               <a:solidFill>
@@ -11276,7 +11190,7 @@
         </p:nvSpPr>
         <p:spPr>
           <a:xfrm>
-            <a:off x="7174116" y="3907592"/>
+            <a:off x="7199517" y="3907592"/>
             <a:ext cx="1055097" cy="461665"/>
           </a:xfrm>
           <a:prstGeom prst="rect">
@@ -11371,7 +11285,7 @@
         </p:nvSpPr>
         <p:spPr>
           <a:xfrm>
-            <a:off x="6107993" y="3897460"/>
+            <a:off x="6133394" y="3897460"/>
             <a:ext cx="840295" cy="461665"/>
           </a:xfrm>
           <a:prstGeom prst="rect">
@@ -11745,6 +11659,197 @@
           </a:p>
         </p:txBody>
       </p:sp>
+      <p:grpSp>
+        <p:nvGrpSpPr>
+          <p:cNvPr id="60" name="Gruppo 59"/>
+          <p:cNvGrpSpPr/>
+          <p:nvPr/>
+        </p:nvGrpSpPr>
+        <p:grpSpPr>
+          <a:xfrm>
+            <a:off x="8479482" y="2443639"/>
+            <a:ext cx="1926426" cy="1214172"/>
+            <a:chOff x="402476" y="5184618"/>
+            <a:chExt cx="1926426" cy="1214172"/>
+          </a:xfrm>
+        </p:grpSpPr>
+        <p:sp>
+          <p:nvSpPr>
+            <p:cNvPr id="62" name="Ovale 61"/>
+            <p:cNvSpPr/>
+            <p:nvPr/>
+          </p:nvSpPr>
+          <p:spPr>
+            <a:xfrm>
+              <a:off x="667957" y="5332857"/>
+              <a:ext cx="1660945" cy="1065933"/>
+            </a:xfrm>
+            <a:prstGeom prst="ellipse">
+              <a:avLst/>
+            </a:prstGeom>
+            <a:solidFill>
+              <a:schemeClr val="accent2">
+                <a:lumMod val="20000"/>
+                <a:lumOff val="80000"/>
+              </a:schemeClr>
+            </a:solidFill>
+            <a:ln w="12700">
+              <a:solidFill>
+                <a:schemeClr val="tx1"/>
+              </a:solidFill>
+            </a:ln>
+          </p:spPr>
+          <p:style>
+            <a:lnRef idx="2">
+              <a:schemeClr val="accent1">
+                <a:shade val="50000"/>
+              </a:schemeClr>
+            </a:lnRef>
+            <a:fillRef idx="1">
+              <a:schemeClr val="accent1"/>
+            </a:fillRef>
+            <a:effectRef idx="0">
+              <a:schemeClr val="accent1"/>
+            </a:effectRef>
+            <a:fontRef idx="minor">
+              <a:schemeClr val="lt1"/>
+            </a:fontRef>
+          </p:style>
+          <p:txBody>
+            <a:bodyPr rtlCol="0" anchor="ctr"/>
+            <a:lstStyle/>
+            <a:p>
+              <a:pPr algn="ctr"/>
+              <a:r>
+                <a:rPr lang="it-IT" sz="1200" dirty="0" smtClean="0">
+                  <a:solidFill>
+                    <a:schemeClr val="tx1"/>
+                  </a:solidFill>
+                  <a:latin typeface="Century Schoolbook" panose="02040604050505020304" pitchFamily="18" charset="0"/>
+                </a:rPr>
+                <a:t>Trolley</a:t>
+              </a:r>
+            </a:p>
+            <a:p>
+              <a:pPr algn="ctr"/>
+              <a:r>
+                <a:rPr lang="it-IT" sz="1200" dirty="0" smtClean="0">
+                  <a:solidFill>
+                    <a:schemeClr val="tx1"/>
+                  </a:solidFill>
+                  <a:latin typeface="Century Schoolbook" panose="02040604050505020304" pitchFamily="18" charset="0"/>
+                </a:rPr>
+                <a:t>Actor</a:t>
+              </a:r>
+              <a:endParaRPr lang="it-IT" sz="1400" i="1" dirty="0">
+                <a:solidFill>
+                  <a:schemeClr val="tx1"/>
+                </a:solidFill>
+                <a:latin typeface="Century Schoolbook" panose="02040604050505020304" pitchFamily="18" charset="0"/>
+              </a:endParaRPr>
+            </a:p>
+          </p:txBody>
+        </p:sp>
+        <p:sp>
+          <p:nvSpPr>
+            <p:cNvPr id="63" name="Triangolo isoscele 62"/>
+            <p:cNvSpPr/>
+            <p:nvPr/>
+          </p:nvSpPr>
+          <p:spPr>
+            <a:xfrm rot="16200000">
+              <a:off x="1350190" y="5205064"/>
+              <a:ext cx="296478" cy="255585"/>
+            </a:xfrm>
+            <a:prstGeom prst="triangle">
+              <a:avLst/>
+            </a:prstGeom>
+            <a:solidFill>
+              <a:srgbClr val="FF0000"/>
+            </a:solidFill>
+            <a:ln w="12700">
+              <a:solidFill>
+                <a:schemeClr val="tx1"/>
+              </a:solidFill>
+            </a:ln>
+          </p:spPr>
+          <p:style>
+            <a:lnRef idx="2">
+              <a:schemeClr val="accent1">
+                <a:shade val="50000"/>
+              </a:schemeClr>
+            </a:lnRef>
+            <a:fillRef idx="1">
+              <a:schemeClr val="accent1"/>
+            </a:fillRef>
+            <a:effectRef idx="0">
+              <a:schemeClr val="accent1"/>
+            </a:effectRef>
+            <a:fontRef idx="minor">
+              <a:schemeClr val="lt1"/>
+            </a:fontRef>
+          </p:style>
+          <p:txBody>
+            <a:bodyPr rtlCol="0" anchor="ctr"/>
+            <a:lstStyle/>
+            <a:p>
+              <a:pPr algn="ctr"/>
+              <a:endParaRPr lang="it-IT"/>
+            </a:p>
+          </p:txBody>
+        </p:sp>
+        <p:sp>
+          <p:nvSpPr>
+            <p:cNvPr id="64" name="Rettangolo 63"/>
+            <p:cNvSpPr/>
+            <p:nvPr/>
+          </p:nvSpPr>
+          <p:spPr>
+            <a:xfrm>
+              <a:off x="402476" y="5739696"/>
+              <a:ext cx="530961" cy="252254"/>
+            </a:xfrm>
+            <a:prstGeom prst="rect">
+              <a:avLst/>
+            </a:prstGeom>
+            <a:solidFill>
+              <a:schemeClr val="accent2">
+                <a:lumMod val="20000"/>
+                <a:lumOff val="80000"/>
+              </a:schemeClr>
+            </a:solidFill>
+            <a:ln w="12700">
+              <a:solidFill>
+                <a:schemeClr val="tx1"/>
+              </a:solidFill>
+            </a:ln>
+          </p:spPr>
+          <p:style>
+            <a:lnRef idx="2">
+              <a:schemeClr val="accent1">
+                <a:shade val="50000"/>
+              </a:schemeClr>
+            </a:lnRef>
+            <a:fillRef idx="1">
+              <a:schemeClr val="accent1"/>
+            </a:fillRef>
+            <a:effectRef idx="0">
+              <a:schemeClr val="accent1"/>
+            </a:effectRef>
+            <a:fontRef idx="minor">
+              <a:schemeClr val="lt1"/>
+            </a:fontRef>
+          </p:style>
+          <p:txBody>
+            <a:bodyPr rtlCol="0" anchor="ctr"/>
+            <a:lstStyle/>
+            <a:p>
+              <a:pPr algn="ctr"/>
+              <a:endParaRPr lang="it-IT"/>
+            </a:p>
+          </p:txBody>
+        </p:sp>
+      </p:grpSp>
     </p:spTree>
     <p:extLst>
       <p:ext uri="{BB962C8B-B14F-4D97-AF65-F5344CB8AC3E}">
@@ -11843,7 +11948,7 @@
                   </a:solidFill>
                   <a:latin typeface="Century Schoolbook" panose="02040604050505020304" pitchFamily="18" charset="0"/>
                 </a:rPr>
-                <a:t>Temperature Sentinel</a:t>
+                <a:t>Temperature Sentinel Actor</a:t>
               </a:r>
             </a:p>
           </p:txBody>
@@ -12034,7 +12139,7 @@
                   </a:solidFill>
                   <a:latin typeface="Century Schoolbook" panose="02040604050505020304" pitchFamily="18" charset="0"/>
                 </a:rPr>
-                <a:t>Sentinel</a:t>
+                <a:t>Sentinel Actor</a:t>
               </a:r>
             </a:p>
           </p:txBody>
@@ -12994,7 +13099,7 @@
         </p:nvSpPr>
         <p:spPr>
           <a:xfrm>
-            <a:off x="4167662" y="3199002"/>
+            <a:off x="4167662" y="3173601"/>
             <a:ext cx="1936749" cy="461665"/>
           </a:xfrm>
           <a:prstGeom prst="rect">
@@ -13264,7 +13369,7 @@
             <a:p>
               <a:pPr algn="ctr"/>
               <a:r>
-                <a:rPr lang="it-IT" sz="1200" dirty="0" smtClean="0">
+                <a:rPr lang="it-IT" sz="1200" dirty="0">
                   <a:solidFill>
                     <a:schemeClr val="tx1"/>
                   </a:solidFill>
@@ -13272,9 +13377,21 @@
                 </a:rPr>
                 <a:t>Park Service Status GUI Actor</a:t>
               </a:r>
+            </a:p>
+            <a:p>
+              <a:pPr lvl="0" algn="ctr"/>
+              <a:r>
+                <a:rPr lang="it-IT" sz="1100" i="1" dirty="0">
+                  <a:solidFill>
+                    <a:prstClr val="black"/>
+                  </a:solidFill>
+                  <a:latin typeface="Century Schoolbook" panose="02040604050505020304" pitchFamily="18" charset="0"/>
+                </a:rPr>
+                <a:t>(manager’s)</a:t>
+              </a:r>
               <a:endParaRPr lang="it-IT" sz="1400" i="1" dirty="0">
                 <a:solidFill>
-                  <a:schemeClr val="tx1"/>
+                  <a:prstClr val="black"/>
                 </a:solidFill>
                 <a:latin typeface="Century Schoolbook" panose="02040604050505020304" pitchFamily="18" charset="0"/>
               </a:endParaRPr>

</xml_diff>